<commit_message>
Mise à jour diapo et doc
</commit_message>
<xml_diff>
--- a/Cyril/Projet Théléton.pptx
+++ b/Cyril/Projet Théléton.pptx
@@ -3991,54 +3991,6 @@
           </a:p>
         </p:txBody>
       </p:sp>
-      <p:sp>
-        <p:nvSpPr>
-          <p:cNvPr id="3" name="Espace réservé du contenu 2">
-            <a:extLst>
-              <a:ext uri="{FF2B5EF4-FFF2-40B4-BE49-F238E27FC236}">
-                <a16:creationId xmlns:a16="http://schemas.microsoft.com/office/drawing/2014/main" id="{E20F4170-89DF-4098-8E16-0C32E51FA8B4}"/>
-              </a:ext>
-            </a:extLst>
-          </p:cNvPr>
-          <p:cNvSpPr>
-            <a:spLocks noGrp="1"/>
-          </p:cNvSpPr>
-          <p:nvPr>
-            <p:ph idx="1"/>
-          </p:nvPr>
-        </p:nvSpPr>
-        <p:spPr>
-          <a:xfrm>
-            <a:off x="6591300" y="1978024"/>
-            <a:ext cx="4838700" cy="4064001"/>
-          </a:xfrm>
-        </p:spPr>
-        <p:txBody>
-          <a:bodyPr numCol="1"/>
-          <a:lstStyle/>
-          <a:p>
-            <a:r>
-              <a:rPr lang="fr-FR" dirty="0"/>
-              <a:t>Créer formulaire d’inscription 																	</a:t>
-            </a:r>
-          </a:p>
-          <a:p>
-            <a:endParaRPr lang="fr-FR" dirty="0"/>
-          </a:p>
-          <a:p>
-            <a:endParaRPr lang="fr-FR" dirty="0"/>
-          </a:p>
-          <a:p>
-            <a:endParaRPr lang="fr-FR" dirty="0"/>
-          </a:p>
-          <a:p>
-            <a:endParaRPr lang="fr-FR" dirty="0"/>
-          </a:p>
-          <a:p>
-            <a:endParaRPr lang="fr-FR" dirty="0"/>
-          </a:p>
-        </p:txBody>
-      </p:sp>
       <p:pic>
         <p:nvPicPr>
           <p:cNvPr id="4" name="Image 3">
@@ -4084,7 +4036,7 @@
         <p:spPr>
           <a:xfrm>
             <a:off x="762000" y="1978024"/>
-            <a:ext cx="4155358" cy="5165726"/>
+            <a:ext cx="10137648" cy="5165726"/>
           </a:xfrm>
           <a:prstGeom prst="rect">
             <a:avLst/>
@@ -4261,7 +4213,7 @@
           <a:p>
             <a:r>
               <a:rPr lang="fr-FR" dirty="0"/>
-              <a:t>Créer une BDD   	</a:t>
+              <a:t>Créer une BDD 	</a:t>
             </a:r>
           </a:p>
           <a:p>
@@ -4291,7 +4243,7 @@
           <a:p>
             <a:r>
               <a:rPr lang="fr-FR" dirty="0"/>
-              <a:t>Attribuer des privilèges					</a:t>
+              <a:t>Attribuer des privilèges sur SQL					</a:t>
             </a:r>
           </a:p>
           <a:p>
@@ -4299,40 +4251,6 @@
           </a:p>
         </p:txBody>
       </p:sp>
-      <p:pic>
-        <p:nvPicPr>
-          <p:cNvPr id="6" name="Image 5">
-            <a:extLst>
-              <a:ext uri="{FF2B5EF4-FFF2-40B4-BE49-F238E27FC236}">
-                <a16:creationId xmlns:a16="http://schemas.microsoft.com/office/drawing/2014/main" id="{B3D83074-FF3B-4316-A4FE-D5CF730BC041}"/>
-              </a:ext>
-            </a:extLst>
-          </p:cNvPr>
-          <p:cNvPicPr/>
-          <p:nvPr/>
-        </p:nvPicPr>
-        <p:blipFill>
-          <a:blip r:embed="rId3">
-            <a:extLst>
-              <a:ext uri="{28A0092B-C50C-407E-A947-70E740481C1C}">
-                <a14:useLocalDpi xmlns:a14="http://schemas.microsoft.com/office/drawing/2010/main" val="0"/>
-              </a:ext>
-            </a:extLst>
-          </a:blip>
-          <a:stretch>
-            <a:fillRect/>
-          </a:stretch>
-        </p:blipFill>
-        <p:spPr>
-          <a:xfrm>
-            <a:off x="6096000" y="2623344"/>
-            <a:ext cx="5238750" cy="2901155"/>
-          </a:xfrm>
-          <a:prstGeom prst="rect">
-            <a:avLst/>
-          </a:prstGeom>
-        </p:spPr>
-      </p:pic>
     </p:spTree>
     <p:extLst>
       <p:ext uri="{BB962C8B-B14F-4D97-AF65-F5344CB8AC3E}">
@@ -4386,7 +4304,7 @@
           <a:p>
             <a:r>
               <a:rPr lang="fr-FR" dirty="0"/>
-              <a:t>Page de connexion </a:t>
+              <a:t>Page de connexion pour superviseur </a:t>
             </a:r>
             <a:br>
               <a:rPr lang="fr-FR" dirty="0"/>
@@ -4415,12 +4333,6 @@
         <p:txBody>
           <a:bodyPr/>
           <a:lstStyle/>
-          <a:p>
-            <a:pPr marL="0" indent="0">
-              <a:buNone/>
-            </a:pPr>
-            <a:endParaRPr lang="fr-FR" dirty="0"/>
-          </a:p>
           <a:p>
             <a:r>
               <a:rPr lang="fr-FR" dirty="0"/>

</xml_diff>